<commit_message>
Add models for testing.
</commit_message>
<xml_diff>
--- a/figs/figs.pptx
+++ b/figs/figs.pptx
@@ -110,6 +110,11 @@
       </a:defRPr>
     </a:lvl9pPr>
   </p:defaultTextStyle>
+  <p:extLst>
+    <p:ext uri="{EFAFB233-063F-42B5-8137-9DF3F51BA10A}">
+      <p15:sldGuideLst xmlns:p15="http://schemas.microsoft.com/office/powerpoint/2012/main"/>
+    </p:ext>
+  </p:extLst>
 </p:presentation>
 </file>
 
@@ -195,7 +200,7 @@
           <a:p>
             <a:fld id="{14764430-45DA-4022-9BAF-68616D26AC21}" type="datetimeFigureOut">
               <a:rPr lang="en-US" smtClean="0"/>
-              <a:t>6/2/2018</a:t>
+              <a:t>6/3/2018</a:t>
             </a:fld>
             <a:endParaRPr lang="en-US"/>
           </a:p>
@@ -700,7 +705,7 @@
           <a:p>
             <a:fld id="{71456E74-2439-4423-8806-644FDA41735A}" type="datetimeFigureOut">
               <a:rPr lang="en-US" smtClean="0"/>
-              <a:t>6/2/2018</a:t>
+              <a:t>6/3/2018</a:t>
             </a:fld>
             <a:endParaRPr lang="en-US"/>
           </a:p>
@@ -898,7 +903,7 @@
           <a:p>
             <a:fld id="{71456E74-2439-4423-8806-644FDA41735A}" type="datetimeFigureOut">
               <a:rPr lang="en-US" smtClean="0"/>
-              <a:t>6/2/2018</a:t>
+              <a:t>6/3/2018</a:t>
             </a:fld>
             <a:endParaRPr lang="en-US"/>
           </a:p>
@@ -1106,7 +1111,7 @@
           <a:p>
             <a:fld id="{71456E74-2439-4423-8806-644FDA41735A}" type="datetimeFigureOut">
               <a:rPr lang="en-US" smtClean="0"/>
-              <a:t>6/2/2018</a:t>
+              <a:t>6/3/2018</a:t>
             </a:fld>
             <a:endParaRPr lang="en-US"/>
           </a:p>
@@ -1304,7 +1309,7 @@
           <a:p>
             <a:fld id="{71456E74-2439-4423-8806-644FDA41735A}" type="datetimeFigureOut">
               <a:rPr lang="en-US" smtClean="0"/>
-              <a:t>6/2/2018</a:t>
+              <a:t>6/3/2018</a:t>
             </a:fld>
             <a:endParaRPr lang="en-US"/>
           </a:p>
@@ -1579,7 +1584,7 @@
           <a:p>
             <a:fld id="{71456E74-2439-4423-8806-644FDA41735A}" type="datetimeFigureOut">
               <a:rPr lang="en-US" smtClean="0"/>
-              <a:t>6/2/2018</a:t>
+              <a:t>6/3/2018</a:t>
             </a:fld>
             <a:endParaRPr lang="en-US"/>
           </a:p>
@@ -1844,7 +1849,7 @@
           <a:p>
             <a:fld id="{71456E74-2439-4423-8806-644FDA41735A}" type="datetimeFigureOut">
               <a:rPr lang="en-US" smtClean="0"/>
-              <a:t>6/2/2018</a:t>
+              <a:t>6/3/2018</a:t>
             </a:fld>
             <a:endParaRPr lang="en-US"/>
           </a:p>
@@ -2256,7 +2261,7 @@
           <a:p>
             <a:fld id="{71456E74-2439-4423-8806-644FDA41735A}" type="datetimeFigureOut">
               <a:rPr lang="en-US" smtClean="0"/>
-              <a:t>6/2/2018</a:t>
+              <a:t>6/3/2018</a:t>
             </a:fld>
             <a:endParaRPr lang="en-US"/>
           </a:p>
@@ -2397,7 +2402,7 @@
           <a:p>
             <a:fld id="{71456E74-2439-4423-8806-644FDA41735A}" type="datetimeFigureOut">
               <a:rPr lang="en-US" smtClean="0"/>
-              <a:t>6/2/2018</a:t>
+              <a:t>6/3/2018</a:t>
             </a:fld>
             <a:endParaRPr lang="en-US"/>
           </a:p>
@@ -2510,7 +2515,7 @@
           <a:p>
             <a:fld id="{71456E74-2439-4423-8806-644FDA41735A}" type="datetimeFigureOut">
               <a:rPr lang="en-US" smtClean="0"/>
-              <a:t>6/2/2018</a:t>
+              <a:t>6/3/2018</a:t>
             </a:fld>
             <a:endParaRPr lang="en-US"/>
           </a:p>
@@ -2821,7 +2826,7 @@
           <a:p>
             <a:fld id="{71456E74-2439-4423-8806-644FDA41735A}" type="datetimeFigureOut">
               <a:rPr lang="en-US" smtClean="0"/>
-              <a:t>6/2/2018</a:t>
+              <a:t>6/3/2018</a:t>
             </a:fld>
             <a:endParaRPr lang="en-US"/>
           </a:p>
@@ -3109,7 +3114,7 @@
           <a:p>
             <a:fld id="{71456E74-2439-4423-8806-644FDA41735A}" type="datetimeFigureOut">
               <a:rPr lang="en-US" smtClean="0"/>
-              <a:t>6/2/2018</a:t>
+              <a:t>6/3/2018</a:t>
             </a:fld>
             <a:endParaRPr lang="en-US"/>
           </a:p>
@@ -3350,7 +3355,7 @@
           <a:p>
             <a:fld id="{71456E74-2439-4423-8806-644FDA41735A}" type="datetimeFigureOut">
               <a:rPr lang="en-US" smtClean="0"/>
-              <a:t>6/2/2018</a:t>
+              <a:t>6/3/2018</a:t>
             </a:fld>
             <a:endParaRPr lang="en-US"/>
           </a:p>
@@ -5824,8 +5829,8 @@
           </a:fontRef>
         </p:style>
       </p:cxnSp>
-      <mc:AlternateContent xmlns:mc="http://schemas.openxmlformats.org/markup-compatibility/2006">
-        <mc:Choice xmlns:a14="http://schemas.microsoft.com/office/drawing/2010/main" Requires="a14">
+      <mc:AlternateContent xmlns:mc="http://schemas.openxmlformats.org/markup-compatibility/2006" xmlns:a14="http://schemas.microsoft.com/office/drawing/2010/main">
+        <mc:Choice Requires="a14">
           <p:sp>
             <p:nvSpPr>
               <p:cNvPr id="62" name="TextBox 61">
@@ -5868,6 +5873,7 @@
               </a:bodyPr>
               <a:lstStyle/>
               <a:p>
+                <a:pPr/>
                 <a14:m>
                   <m:oMathPara xmlns:m="http://schemas.openxmlformats.org/officeDocument/2006/math">
                     <m:oMathParaPr>
@@ -5894,7 +5900,7 @@
             </p:txBody>
           </p:sp>
         </mc:Choice>
-        <mc:Fallback>
+        <mc:Fallback xmlns="">
           <p:sp>
             <p:nvSpPr>
               <p:cNvPr id="62" name="TextBox 61">
@@ -5965,7 +5971,7 @@
         </p:nvSpPr>
         <p:spPr>
           <a:xfrm>
-            <a:off x="6697332" y="3020051"/>
+            <a:off x="6684909" y="3004046"/>
             <a:ext cx="513282" cy="646331"/>
           </a:xfrm>
           <a:prstGeom prst="rect">
@@ -6086,8 +6092,8 @@
           </a:p>
         </p:txBody>
       </p:sp>
-      <mc:AlternateContent xmlns:mc="http://schemas.openxmlformats.org/markup-compatibility/2006">
-        <mc:Choice xmlns:a14="http://schemas.microsoft.com/office/drawing/2010/main" Requires="a14">
+      <mc:AlternateContent xmlns:mc="http://schemas.openxmlformats.org/markup-compatibility/2006" xmlns:a14="http://schemas.microsoft.com/office/drawing/2010/main">
+        <mc:Choice Requires="a14">
           <p:sp>
             <p:nvSpPr>
               <p:cNvPr id="83" name="TextBox 82">
@@ -6116,6 +6122,7 @@
               </a:bodyPr>
               <a:lstStyle/>
               <a:p>
+                <a:pPr/>
                 <a14:m>
                   <m:oMathPara xmlns:m="http://schemas.openxmlformats.org/officeDocument/2006/math">
                     <m:oMathParaPr>
@@ -6138,7 +6145,7 @@
             </p:txBody>
           </p:sp>
         </mc:Choice>
-        <mc:Fallback>
+        <mc:Fallback xmlns="">
           <p:sp>
             <p:nvSpPr>
               <p:cNvPr id="83" name="TextBox 82">
@@ -6305,8 +6312,8 @@
           <a:chExt cx="0" cy="0"/>
         </a:xfrm>
       </p:grpSpPr>
-      <mc:AlternateContent xmlns:mc="http://schemas.openxmlformats.org/markup-compatibility/2006">
-        <mc:Choice xmlns:a14="http://schemas.microsoft.com/office/drawing/2010/main" Requires="a14">
+      <mc:AlternateContent xmlns:mc="http://schemas.openxmlformats.org/markup-compatibility/2006" xmlns:a14="http://schemas.microsoft.com/office/drawing/2010/main">
+        <mc:Choice Requires="a14">
           <p:graphicFrame>
             <p:nvGraphicFramePr>
               <p:cNvPr id="8" name="Table 7">
@@ -9862,7 +9869,7 @@
             </a:graphic>
           </p:graphicFrame>
         </mc:Choice>
-        <mc:Fallback>
+        <mc:Fallback xmlns="">
           <p:graphicFrame>
             <p:nvGraphicFramePr>
               <p:cNvPr id="8" name="Table 7">
@@ -13327,8 +13334,8 @@
           </p:graphicFrame>
         </mc:Fallback>
       </mc:AlternateContent>
-      <mc:AlternateContent xmlns:mc="http://schemas.openxmlformats.org/markup-compatibility/2006">
-        <mc:Choice xmlns:a14="http://schemas.microsoft.com/office/drawing/2010/main" Requires="a14">
+      <mc:AlternateContent xmlns:mc="http://schemas.openxmlformats.org/markup-compatibility/2006" xmlns:a14="http://schemas.microsoft.com/office/drawing/2010/main">
+        <mc:Choice Requires="a14">
           <p:graphicFrame>
             <p:nvGraphicFramePr>
               <p:cNvPr id="9" name="Table 8">
@@ -15453,7 +15460,7 @@
             </a:graphic>
           </p:graphicFrame>
         </mc:Choice>
-        <mc:Fallback>
+        <mc:Fallback xmlns="">
           <p:graphicFrame>
             <p:nvGraphicFramePr>
               <p:cNvPr id="9" name="Table 8">

</xml_diff>

<commit_message>
Update poster to FINAL.
</commit_message>
<xml_diff>
--- a/figs/figs.pptx
+++ b/figs/figs.pptx
@@ -35826,6 +35826,294 @@
           <a:chExt cx="0" cy="0"/>
         </a:xfrm>
       </p:grpSpPr>
+      <p:pic>
+        <p:nvPicPr>
+          <p:cNvPr id="5" name="Picture 4">
+            <a:extLst>
+              <a:ext uri="{FF2B5EF4-FFF2-40B4-BE49-F238E27FC236}">
+                <a16:creationId xmlns:a16="http://schemas.microsoft.com/office/drawing/2014/main" id="{EEF07503-A666-4C8F-9BEC-98B3B3B6AF3B}"/>
+              </a:ext>
+            </a:extLst>
+          </p:cNvPr>
+          <p:cNvPicPr>
+            <a:picLocks noChangeAspect="1"/>
+          </p:cNvPicPr>
+          <p:nvPr/>
+        </p:nvPicPr>
+        <p:blipFill>
+          <a:blip r:embed="rId2">
+            <a:extLst>
+              <a:ext uri="{28A0092B-C50C-407E-A947-70E740481C1C}">
+                <a14:useLocalDpi xmlns:a14="http://schemas.microsoft.com/office/drawing/2010/main" val="0"/>
+              </a:ext>
+            </a:extLst>
+          </a:blip>
+          <a:stretch>
+            <a:fillRect/>
+          </a:stretch>
+        </p:blipFill>
+        <p:spPr>
+          <a:xfrm>
+            <a:off x="5486400" y="2819400"/>
+            <a:ext cx="1219200" cy="1219200"/>
+          </a:xfrm>
+          <a:prstGeom prst="rect">
+            <a:avLst/>
+          </a:prstGeom>
+        </p:spPr>
+      </p:pic>
+      <p:pic>
+        <p:nvPicPr>
+          <p:cNvPr id="7" name="Picture 6">
+            <a:extLst>
+              <a:ext uri="{FF2B5EF4-FFF2-40B4-BE49-F238E27FC236}">
+                <a16:creationId xmlns:a16="http://schemas.microsoft.com/office/drawing/2014/main" id="{3082885D-274E-46D5-8BED-82508A13E13C}"/>
+              </a:ext>
+            </a:extLst>
+          </p:cNvPr>
+          <p:cNvPicPr>
+            <a:picLocks noChangeAspect="1"/>
+          </p:cNvPicPr>
+          <p:nvPr/>
+        </p:nvPicPr>
+        <p:blipFill>
+          <a:blip r:embed="rId3">
+            <a:extLst>
+              <a:ext uri="{28A0092B-C50C-407E-A947-70E740481C1C}">
+                <a14:useLocalDpi xmlns:a14="http://schemas.microsoft.com/office/drawing/2010/main" val="0"/>
+              </a:ext>
+            </a:extLst>
+          </a:blip>
+          <a:stretch>
+            <a:fillRect/>
+          </a:stretch>
+        </p:blipFill>
+        <p:spPr>
+          <a:xfrm>
+            <a:off x="4000500" y="2819400"/>
+            <a:ext cx="1219200" cy="1219200"/>
+          </a:xfrm>
+          <a:prstGeom prst="rect">
+            <a:avLst/>
+          </a:prstGeom>
+        </p:spPr>
+      </p:pic>
+      <p:pic>
+        <p:nvPicPr>
+          <p:cNvPr id="9" name="Picture 8">
+            <a:extLst>
+              <a:ext uri="{FF2B5EF4-FFF2-40B4-BE49-F238E27FC236}">
+                <a16:creationId xmlns:a16="http://schemas.microsoft.com/office/drawing/2014/main" id="{6CCCA750-768E-44DA-8CE8-45BB530EBCD9}"/>
+              </a:ext>
+            </a:extLst>
+          </p:cNvPr>
+          <p:cNvPicPr>
+            <a:picLocks noChangeAspect="1"/>
+          </p:cNvPicPr>
+          <p:nvPr/>
+        </p:nvPicPr>
+        <p:blipFill>
+          <a:blip r:embed="rId4">
+            <a:extLst>
+              <a:ext uri="{28A0092B-C50C-407E-A947-70E740481C1C}">
+                <a14:useLocalDpi xmlns:a14="http://schemas.microsoft.com/office/drawing/2010/main" val="0"/>
+              </a:ext>
+            </a:extLst>
+          </a:blip>
+          <a:stretch>
+            <a:fillRect/>
+          </a:stretch>
+        </p:blipFill>
+        <p:spPr>
+          <a:xfrm>
+            <a:off x="5486400" y="4110990"/>
+            <a:ext cx="1219200" cy="1219200"/>
+          </a:xfrm>
+          <a:prstGeom prst="rect">
+            <a:avLst/>
+          </a:prstGeom>
+        </p:spPr>
+      </p:pic>
+      <p:pic>
+        <p:nvPicPr>
+          <p:cNvPr id="11" name="Picture 10">
+            <a:extLst>
+              <a:ext uri="{FF2B5EF4-FFF2-40B4-BE49-F238E27FC236}">
+                <a16:creationId xmlns:a16="http://schemas.microsoft.com/office/drawing/2014/main" id="{4101C190-CB8A-44B8-984B-E344F1FD9578}"/>
+              </a:ext>
+            </a:extLst>
+          </p:cNvPr>
+          <p:cNvPicPr>
+            <a:picLocks noChangeAspect="1"/>
+          </p:cNvPicPr>
+          <p:nvPr/>
+        </p:nvPicPr>
+        <p:blipFill>
+          <a:blip r:embed="rId5">
+            <a:extLst>
+              <a:ext uri="{28A0092B-C50C-407E-A947-70E740481C1C}">
+                <a14:useLocalDpi xmlns:a14="http://schemas.microsoft.com/office/drawing/2010/main" val="0"/>
+              </a:ext>
+            </a:extLst>
+          </a:blip>
+          <a:stretch>
+            <a:fillRect/>
+          </a:stretch>
+        </p:blipFill>
+        <p:spPr>
+          <a:xfrm>
+            <a:off x="4000500" y="4110990"/>
+            <a:ext cx="1219200" cy="1219200"/>
+          </a:xfrm>
+          <a:prstGeom prst="rect">
+            <a:avLst/>
+          </a:prstGeom>
+        </p:spPr>
+      </p:pic>
+      <p:pic>
+        <p:nvPicPr>
+          <p:cNvPr id="13" name="Picture 12">
+            <a:extLst>
+              <a:ext uri="{FF2B5EF4-FFF2-40B4-BE49-F238E27FC236}">
+                <a16:creationId xmlns:a16="http://schemas.microsoft.com/office/drawing/2014/main" id="{4CF5C941-B3F9-4C4F-93E7-72F00D9C33FE}"/>
+              </a:ext>
+            </a:extLst>
+          </p:cNvPr>
+          <p:cNvPicPr>
+            <a:picLocks noChangeAspect="1"/>
+          </p:cNvPicPr>
+          <p:nvPr/>
+        </p:nvPicPr>
+        <p:blipFill>
+          <a:blip r:embed="rId6">
+            <a:extLst>
+              <a:ext uri="{28A0092B-C50C-407E-A947-70E740481C1C}">
+                <a14:useLocalDpi xmlns:a14="http://schemas.microsoft.com/office/drawing/2010/main" val="0"/>
+              </a:ext>
+            </a:extLst>
+          </a:blip>
+          <a:stretch>
+            <a:fillRect/>
+          </a:stretch>
+        </p:blipFill>
+        <p:spPr>
+          <a:xfrm>
+            <a:off x="4000500" y="1564005"/>
+            <a:ext cx="1219200" cy="1219200"/>
+          </a:xfrm>
+          <a:prstGeom prst="rect">
+            <a:avLst/>
+          </a:prstGeom>
+        </p:spPr>
+      </p:pic>
+      <p:pic>
+        <p:nvPicPr>
+          <p:cNvPr id="15" name="Picture 14">
+            <a:extLst>
+              <a:ext uri="{FF2B5EF4-FFF2-40B4-BE49-F238E27FC236}">
+                <a16:creationId xmlns:a16="http://schemas.microsoft.com/office/drawing/2014/main" id="{97C54EDC-A385-47BC-ADD3-11F69105BA8D}"/>
+              </a:ext>
+            </a:extLst>
+          </p:cNvPr>
+          <p:cNvPicPr>
+            <a:picLocks noChangeAspect="1"/>
+          </p:cNvPicPr>
+          <p:nvPr/>
+        </p:nvPicPr>
+        <p:blipFill>
+          <a:blip r:embed="rId7">
+            <a:extLst>
+              <a:ext uri="{28A0092B-C50C-407E-A947-70E740481C1C}">
+                <a14:useLocalDpi xmlns:a14="http://schemas.microsoft.com/office/drawing/2010/main" val="0"/>
+              </a:ext>
+            </a:extLst>
+          </a:blip>
+          <a:stretch>
+            <a:fillRect/>
+          </a:stretch>
+        </p:blipFill>
+        <p:spPr>
+          <a:xfrm>
+            <a:off x="5486400" y="1564005"/>
+            <a:ext cx="1219200" cy="1219200"/>
+          </a:xfrm>
+          <a:prstGeom prst="rect">
+            <a:avLst/>
+          </a:prstGeom>
+        </p:spPr>
+      </p:pic>
+      <p:pic>
+        <p:nvPicPr>
+          <p:cNvPr id="17" name="Picture 16">
+            <a:extLst>
+              <a:ext uri="{FF2B5EF4-FFF2-40B4-BE49-F238E27FC236}">
+                <a16:creationId xmlns:a16="http://schemas.microsoft.com/office/drawing/2014/main" id="{85DC138A-333B-4414-B42A-8528EA6397A9}"/>
+              </a:ext>
+            </a:extLst>
+          </p:cNvPr>
+          <p:cNvPicPr>
+            <a:picLocks noChangeAspect="1"/>
+          </p:cNvPicPr>
+          <p:nvPr/>
+        </p:nvPicPr>
+        <p:blipFill>
+          <a:blip r:embed="rId8">
+            <a:extLst>
+              <a:ext uri="{28A0092B-C50C-407E-A947-70E740481C1C}">
+                <a14:useLocalDpi xmlns:a14="http://schemas.microsoft.com/office/drawing/2010/main" val="0"/>
+              </a:ext>
+            </a:extLst>
+          </a:blip>
+          <a:stretch>
+            <a:fillRect/>
+          </a:stretch>
+        </p:blipFill>
+        <p:spPr>
+          <a:xfrm>
+            <a:off x="5486400" y="5444490"/>
+            <a:ext cx="1219200" cy="1219200"/>
+          </a:xfrm>
+          <a:prstGeom prst="rect">
+            <a:avLst/>
+          </a:prstGeom>
+        </p:spPr>
+      </p:pic>
+      <p:pic>
+        <p:nvPicPr>
+          <p:cNvPr id="19" name="Picture 18">
+            <a:extLst>
+              <a:ext uri="{FF2B5EF4-FFF2-40B4-BE49-F238E27FC236}">
+                <a16:creationId xmlns:a16="http://schemas.microsoft.com/office/drawing/2014/main" id="{BE8F42D6-D3EC-4274-9B83-CDF12C22B588}"/>
+              </a:ext>
+            </a:extLst>
+          </p:cNvPr>
+          <p:cNvPicPr>
+            <a:picLocks noChangeAspect="1"/>
+          </p:cNvPicPr>
+          <p:nvPr/>
+        </p:nvPicPr>
+        <p:blipFill>
+          <a:blip r:embed="rId9">
+            <a:extLst>
+              <a:ext uri="{28A0092B-C50C-407E-A947-70E740481C1C}">
+                <a14:useLocalDpi xmlns:a14="http://schemas.microsoft.com/office/drawing/2010/main" val="0"/>
+              </a:ext>
+            </a:extLst>
+          </a:blip>
+          <a:stretch>
+            <a:fillRect/>
+          </a:stretch>
+        </p:blipFill>
+        <p:spPr>
+          <a:xfrm>
+            <a:off x="4000500" y="5444490"/>
+            <a:ext cx="1219200" cy="1219200"/>
+          </a:xfrm>
+          <a:prstGeom prst="rect">
+            <a:avLst/>
+          </a:prstGeom>
+        </p:spPr>
+      </p:pic>
     </p:spTree>
     <p:extLst>
       <p:ext uri="{BB962C8B-B14F-4D97-AF65-F5344CB8AC3E}">

</xml_diff>